<commit_message>
feat: add logbook design for 2023-2024
</commit_message>
<xml_diff>
--- a/design/logbook.pptx
+++ b/design/logbook.pptx
@@ -6,13 +6,11 @@
   </p:sldMasterIdLst>
   <p:sldIdLst>
     <p:sldId id="256" r:id="rId2"/>
-    <p:sldId id="257" r:id="rId3"/>
-    <p:sldId id="258" r:id="rId4"/>
   </p:sldIdLst>
   <p:sldSz cx="6858000" cy="9144000" type="letter"/>
   <p:notesSz cx="6858000" cy="9144000"/>
   <p:custDataLst>
-    <p:tags r:id="rId5"/>
+    <p:tags r:id="rId3"/>
   </p:custDataLst>
   <p:defaultTextStyle>
     <a:defPPr>
@@ -279,7 +277,7 @@
           <a:p>
             <a:fld id="{0977E0B7-D145-4AB4-9E86-E5C2DE573AF7}" type="datetimeFigureOut">
               <a:rPr lang="zh-CN" altLang="en-US" smtClean="0"/>
-              <a:t>2022/12/22</a:t>
+              <a:t>2023/9/13</a:t>
             </a:fld>
             <a:endParaRPr lang="zh-CN" altLang="en-US"/>
           </a:p>
@@ -449,7 +447,7 @@
           <a:p>
             <a:fld id="{0977E0B7-D145-4AB4-9E86-E5C2DE573AF7}" type="datetimeFigureOut">
               <a:rPr lang="zh-CN" altLang="en-US" smtClean="0"/>
-              <a:t>2022/12/22</a:t>
+              <a:t>2023/9/13</a:t>
             </a:fld>
             <a:endParaRPr lang="zh-CN" altLang="en-US"/>
           </a:p>
@@ -629,7 +627,7 @@
           <a:p>
             <a:fld id="{0977E0B7-D145-4AB4-9E86-E5C2DE573AF7}" type="datetimeFigureOut">
               <a:rPr lang="zh-CN" altLang="en-US" smtClean="0"/>
-              <a:t>2022/12/22</a:t>
+              <a:t>2023/9/13</a:t>
             </a:fld>
             <a:endParaRPr lang="zh-CN" altLang="en-US"/>
           </a:p>
@@ -799,7 +797,7 @@
           <a:p>
             <a:fld id="{0977E0B7-D145-4AB4-9E86-E5C2DE573AF7}" type="datetimeFigureOut">
               <a:rPr lang="zh-CN" altLang="en-US" smtClean="0"/>
-              <a:t>2022/12/22</a:t>
+              <a:t>2023/9/13</a:t>
             </a:fld>
             <a:endParaRPr lang="zh-CN" altLang="en-US"/>
           </a:p>
@@ -1043,7 +1041,7 @@
           <a:p>
             <a:fld id="{0977E0B7-D145-4AB4-9E86-E5C2DE573AF7}" type="datetimeFigureOut">
               <a:rPr lang="zh-CN" altLang="en-US" smtClean="0"/>
-              <a:t>2022/12/22</a:t>
+              <a:t>2023/9/13</a:t>
             </a:fld>
             <a:endParaRPr lang="zh-CN" altLang="en-US"/>
           </a:p>
@@ -1275,7 +1273,7 @@
           <a:p>
             <a:fld id="{0977E0B7-D145-4AB4-9E86-E5C2DE573AF7}" type="datetimeFigureOut">
               <a:rPr lang="zh-CN" altLang="en-US" smtClean="0"/>
-              <a:t>2022/12/22</a:t>
+              <a:t>2023/9/13</a:t>
             </a:fld>
             <a:endParaRPr lang="zh-CN" altLang="en-US"/>
           </a:p>
@@ -1642,7 +1640,7 @@
           <a:p>
             <a:fld id="{0977E0B7-D145-4AB4-9E86-E5C2DE573AF7}" type="datetimeFigureOut">
               <a:rPr lang="zh-CN" altLang="en-US" smtClean="0"/>
-              <a:t>2022/12/22</a:t>
+              <a:t>2023/9/13</a:t>
             </a:fld>
             <a:endParaRPr lang="zh-CN" altLang="en-US"/>
           </a:p>
@@ -1760,7 +1758,7 @@
           <a:p>
             <a:fld id="{0977E0B7-D145-4AB4-9E86-E5C2DE573AF7}" type="datetimeFigureOut">
               <a:rPr lang="zh-CN" altLang="en-US" smtClean="0"/>
-              <a:t>2022/12/22</a:t>
+              <a:t>2023/9/13</a:t>
             </a:fld>
             <a:endParaRPr lang="zh-CN" altLang="en-US"/>
           </a:p>
@@ -1855,7 +1853,7 @@
           <a:p>
             <a:fld id="{0977E0B7-D145-4AB4-9E86-E5C2DE573AF7}" type="datetimeFigureOut">
               <a:rPr lang="zh-CN" altLang="en-US" smtClean="0"/>
-              <a:t>2022/12/22</a:t>
+              <a:t>2023/9/13</a:t>
             </a:fld>
             <a:endParaRPr lang="zh-CN" altLang="en-US"/>
           </a:p>
@@ -2132,7 +2130,7 @@
           <a:p>
             <a:fld id="{0977E0B7-D145-4AB4-9E86-E5C2DE573AF7}" type="datetimeFigureOut">
               <a:rPr lang="zh-CN" altLang="en-US" smtClean="0"/>
-              <a:t>2022/12/22</a:t>
+              <a:t>2023/9/13</a:t>
             </a:fld>
             <a:endParaRPr lang="zh-CN" altLang="en-US"/>
           </a:p>
@@ -2389,7 +2387,7 @@
           <a:p>
             <a:fld id="{0977E0B7-D145-4AB4-9E86-E5C2DE573AF7}" type="datetimeFigureOut">
               <a:rPr lang="zh-CN" altLang="en-US" smtClean="0"/>
-              <a:t>2022/12/22</a:t>
+              <a:t>2023/9/13</a:t>
             </a:fld>
             <a:endParaRPr lang="zh-CN" altLang="en-US"/>
           </a:p>
@@ -2602,7 +2600,7 @@
           <a:p>
             <a:fld id="{0977E0B7-D145-4AB4-9E86-E5C2DE573AF7}" type="datetimeFigureOut">
               <a:rPr lang="zh-CN" altLang="en-US" smtClean="0"/>
-              <a:t>2022/12/22</a:t>
+              <a:t>2023/9/13</a:t>
             </a:fld>
             <a:endParaRPr lang="zh-CN" altLang="en-US"/>
           </a:p>
@@ -3043,6 +3041,41 @@
           <a:chExt cx="0" cy="0"/>
         </a:xfrm>
       </p:grpSpPr>
+      <p:pic>
+        <p:nvPicPr>
+          <p:cNvPr id="14" name="Picture 13" descr="A logo for a company&#10;&#10;Description automatically generated">
+            <a:extLst>
+              <a:ext uri="{FF2B5EF4-FFF2-40B4-BE49-F238E27FC236}">
+                <a16:creationId xmlns:a16="http://schemas.microsoft.com/office/drawing/2014/main" id="{6BB2E9B8-1CF5-DF31-96B8-6A2D0030032F}"/>
+              </a:ext>
+            </a:extLst>
+          </p:cNvPr>
+          <p:cNvPicPr>
+            <a:picLocks noChangeAspect="1"/>
+          </p:cNvPicPr>
+          <p:nvPr/>
+        </p:nvPicPr>
+        <p:blipFill rotWithShape="1">
+          <a:blip r:embed="rId2">
+            <a:extLst>
+              <a:ext uri="{28A0092B-C50C-407E-A947-70E740481C1C}">
+                <a14:useLocalDpi xmlns:a14="http://schemas.microsoft.com/office/drawing/2010/main" val="0"/>
+              </a:ext>
+            </a:extLst>
+          </a:blip>
+          <a:srcRect b="32573"/>
+          <a:stretch/>
+        </p:blipFill>
+        <p:spPr>
+          <a:xfrm>
+            <a:off x="0" y="76200"/>
+            <a:ext cx="6858000" cy="1498320"/>
+          </a:xfrm>
+          <a:prstGeom prst="rect">
+            <a:avLst/>
+          </a:prstGeom>
+        </p:spPr>
+      </p:pic>
       <p:sp>
         <p:nvSpPr>
           <p:cNvPr id="32" name="Rectangle 31">
@@ -3063,6 +3096,9 @@
           <a:prstGeom prst="rect">
             <a:avLst/>
           </a:prstGeom>
+          <a:solidFill>
+            <a:srgbClr val="FFAB00"/>
+          </a:solidFill>
           <a:ln>
             <a:noFill/>
           </a:ln>
@@ -3136,16 +3172,10 @@
               </a:spcAft>
             </a:pPr>
             <a:r>
-              <a:rPr lang="en-US" altLang="zh-CN" sz="1600" dirty="0" err="1">
-                <a:latin typeface="Garamond" panose="02020404030301010803" pitchFamily="18" charset="0"/>
-              </a:rPr>
-              <a:t>Robodragons</a:t>
-            </a:r>
-            <a:r>
               <a:rPr lang="en-US" altLang="zh-CN" sz="1600" dirty="0">
                 <a:latin typeface="Garamond" panose="02020404030301010803" pitchFamily="18" charset="0"/>
               </a:rPr>
-              <a:t> Red Team 16796</a:t>
+              <a:t>Red RoboDragons Team 16796</a:t>
             </a:r>
           </a:p>
           <a:p>
@@ -3158,7 +3188,7 @@
               <a:rPr lang="en-US" altLang="zh-CN" sz="1600" dirty="0">
                 <a:latin typeface="Garamond" panose="02020404030301010803" pitchFamily="18" charset="0"/>
               </a:rPr>
-              <a:t>December 22, 2022</a:t>
+              <a:t>September 13, 2023</a:t>
             </a:r>
           </a:p>
         </p:txBody>
@@ -3169,82 +3199,6 @@
             <a:extLst>
               <a:ext uri="{FF2B5EF4-FFF2-40B4-BE49-F238E27FC236}">
                 <a16:creationId xmlns:a16="http://schemas.microsoft.com/office/drawing/2014/main" id="{F55E7838-24FA-6B8F-99A6-867F4584B03D}"/>
-              </a:ext>
-            </a:extLst>
-          </p:cNvPr>
-          <p:cNvPicPr>
-            <a:picLocks noChangeAspect="1"/>
-          </p:cNvPicPr>
-          <p:nvPr/>
-        </p:nvPicPr>
-        <p:blipFill>
-          <a:blip r:embed="rId2">
-            <a:extLst>
-              <a:ext uri="{28A0092B-C50C-407E-A947-70E740481C1C}">
-                <a14:useLocalDpi xmlns:a14="http://schemas.microsoft.com/office/drawing/2010/main" val="0"/>
-              </a:ext>
-            </a:extLst>
-          </a:blip>
-          <a:stretch>
-            <a:fillRect/>
-          </a:stretch>
-        </p:blipFill>
-        <p:spPr>
-          <a:xfrm>
-            <a:off x="2971153" y="7049926"/>
-            <a:ext cx="908304" cy="595474"/>
-          </a:xfrm>
-          <a:prstGeom prst="rect">
-            <a:avLst/>
-          </a:prstGeom>
-        </p:spPr>
-      </p:pic>
-      <p:sp>
-        <p:nvSpPr>
-          <p:cNvPr id="9" name="TextBox 8">
-            <a:extLst>
-              <a:ext uri="{FF2B5EF4-FFF2-40B4-BE49-F238E27FC236}">
-                <a16:creationId xmlns:a16="http://schemas.microsoft.com/office/drawing/2014/main" id="{3E46B08A-2119-254D-56D6-F3CA4C4D74F3}"/>
-              </a:ext>
-            </a:extLst>
-          </p:cNvPr>
-          <p:cNvSpPr txBox="1"/>
-          <p:nvPr/>
-        </p:nvSpPr>
-        <p:spPr>
-          <a:xfrm>
-            <a:off x="368300" y="1673446"/>
-            <a:ext cx="6114010" cy="1888473"/>
-          </a:xfrm>
-          <a:prstGeom prst="rect">
-            <a:avLst/>
-          </a:prstGeom>
-          <a:noFill/>
-        </p:spPr>
-        <p:txBody>
-          <a:bodyPr wrap="square" rtlCol="0">
-            <a:spAutoFit/>
-          </a:bodyPr>
-          <a:lstStyle/>
-          <a:p>
-            <a:r>
-              <a:rPr lang="en-US" altLang="zh-CN" sz="6000" b="1" dirty="0">
-                <a:solidFill>
-                  <a:schemeClr val="bg1"/>
-                </a:solidFill>
-                <a:latin typeface="Garamond" panose="02020404030301010803" pitchFamily="18" charset="0"/>
-              </a:rPr>
-              <a:t>Engineering Notebook</a:t>
-            </a:r>
-          </a:p>
-        </p:txBody>
-      </p:sp>
-      <p:pic>
-        <p:nvPicPr>
-          <p:cNvPr id="35" name="Picture 34" descr="Logo, company name&#10;&#10;Description automatically generated">
-            <a:extLst>
-              <a:ext uri="{FF2B5EF4-FFF2-40B4-BE49-F238E27FC236}">
-                <a16:creationId xmlns:a16="http://schemas.microsoft.com/office/drawing/2014/main" id="{4CA7E1E1-B2DE-A3E4-D26F-5A1AA615C3A7}"/>
               </a:ext>
             </a:extLst>
           </p:cNvPr>
@@ -3267,8 +3221,85 @@
         </p:blipFill>
         <p:spPr>
           <a:xfrm>
-            <a:off x="4969197" y="1673446"/>
-            <a:ext cx="1384432" cy="1888473"/>
+            <a:off x="2971153" y="7049926"/>
+            <a:ext cx="908304" cy="595474"/>
+          </a:xfrm>
+          <a:prstGeom prst="rect">
+            <a:avLst/>
+          </a:prstGeom>
+        </p:spPr>
+      </p:pic>
+      <p:sp>
+        <p:nvSpPr>
+          <p:cNvPr id="9" name="TextBox 8">
+            <a:extLst>
+              <a:ext uri="{FF2B5EF4-FFF2-40B4-BE49-F238E27FC236}">
+                <a16:creationId xmlns:a16="http://schemas.microsoft.com/office/drawing/2014/main" id="{3E46B08A-2119-254D-56D6-F3CA4C4D74F3}"/>
+              </a:ext>
+            </a:extLst>
+          </p:cNvPr>
+          <p:cNvSpPr txBox="1"/>
+          <p:nvPr/>
+        </p:nvSpPr>
+        <p:spPr>
+          <a:xfrm>
+            <a:off x="368300" y="1801934"/>
+            <a:ext cx="6114010" cy="1631216"/>
+          </a:xfrm>
+          <a:prstGeom prst="rect">
+            <a:avLst/>
+          </a:prstGeom>
+          <a:noFill/>
+        </p:spPr>
+        <p:txBody>
+          <a:bodyPr wrap="square" rtlCol="0" anchor="ctr">
+            <a:spAutoFit/>
+          </a:bodyPr>
+          <a:lstStyle/>
+          <a:p>
+            <a:r>
+              <a:rPr lang="en-US" altLang="zh-CN" sz="5000" b="1" dirty="0">
+                <a:solidFill>
+                  <a:schemeClr val="bg1"/>
+                </a:solidFill>
+                <a:latin typeface="Inter" panose="02000503000000020004" pitchFamily="50" charset="0"/>
+                <a:ea typeface="Inter" panose="02000503000000020004" pitchFamily="50" charset="0"/>
+                <a:cs typeface="Inter" panose="02000503000000020004" pitchFamily="50" charset="0"/>
+              </a:rPr>
+              <a:t>Engineering Notebook</a:t>
+            </a:r>
+          </a:p>
+        </p:txBody>
+      </p:sp>
+      <p:pic>
+        <p:nvPicPr>
+          <p:cNvPr id="12" name="Picture 11" descr="A logo of a company&#10;&#10;Description automatically generated with medium confidence">
+            <a:extLst>
+              <a:ext uri="{FF2B5EF4-FFF2-40B4-BE49-F238E27FC236}">
+                <a16:creationId xmlns:a16="http://schemas.microsoft.com/office/drawing/2014/main" id="{3EDA1A56-380F-072B-369B-264ED2AE45C1}"/>
+              </a:ext>
+            </a:extLst>
+          </p:cNvPr>
+          <p:cNvPicPr>
+            <a:picLocks noChangeAspect="1"/>
+          </p:cNvPicPr>
+          <p:nvPr/>
+        </p:nvPicPr>
+        <p:blipFill rotWithShape="1">
+          <a:blip r:embed="rId4">
+            <a:extLst>
+              <a:ext uri="{28A0092B-C50C-407E-A947-70E740481C1C}">
+                <a14:useLocalDpi xmlns:a14="http://schemas.microsoft.com/office/drawing/2010/main" val="0"/>
+              </a:ext>
+            </a:extLst>
+          </a:blip>
+          <a:srcRect b="20273"/>
+          <a:stretch/>
+        </p:blipFill>
+        <p:spPr>
+          <a:xfrm>
+            <a:off x="4419599" y="1840088"/>
+            <a:ext cx="2250555" cy="1618462"/>
           </a:xfrm>
           <a:prstGeom prst="rect">
             <a:avLst/>
@@ -3279,438 +3310,6 @@
     <p:extLst>
       <p:ext uri="{BB962C8B-B14F-4D97-AF65-F5344CB8AC3E}">
         <p14:creationId xmlns:p14="http://schemas.microsoft.com/office/powerpoint/2010/main" val="634456401"/>
-      </p:ext>
-    </p:extLst>
-  </p:cSld>
-  <p:clrMapOvr>
-    <a:masterClrMapping/>
-  </p:clrMapOvr>
-</p:sld>
-</file>
-
-<file path=ppt/slides/slide2.xml><?xml version="1.0" encoding="utf-8"?>
-<p:sld xmlns:a="http://schemas.openxmlformats.org/drawingml/2006/main" xmlns:r="http://schemas.openxmlformats.org/officeDocument/2006/relationships" xmlns:p="http://schemas.openxmlformats.org/presentationml/2006/main">
-  <p:cSld>
-    <p:spTree>
-      <p:nvGrpSpPr>
-        <p:cNvPr id="1" name=""/>
-        <p:cNvGrpSpPr/>
-        <p:nvPr/>
-      </p:nvGrpSpPr>
-      <p:grpSpPr>
-        <a:xfrm>
-          <a:off x="0" y="0"/>
-          <a:ext cx="0" cy="0"/>
-          <a:chOff x="0" y="0"/>
-          <a:chExt cx="0" cy="0"/>
-        </a:xfrm>
-      </p:grpSpPr>
-      <p:sp>
-        <p:nvSpPr>
-          <p:cNvPr id="8" name="TextBox 7">
-            <a:extLst>
-              <a:ext uri="{FF2B5EF4-FFF2-40B4-BE49-F238E27FC236}">
-                <a16:creationId xmlns:a16="http://schemas.microsoft.com/office/drawing/2014/main" id="{054ECD06-C519-CB1F-335A-43BD026C50A1}"/>
-              </a:ext>
-            </a:extLst>
-          </p:cNvPr>
-          <p:cNvSpPr txBox="1"/>
-          <p:nvPr/>
-        </p:nvSpPr>
-        <p:spPr>
-          <a:xfrm>
-            <a:off x="1590040" y="7594687"/>
-            <a:ext cx="3670530" cy="636072"/>
-          </a:xfrm>
-          <a:prstGeom prst="rect">
-            <a:avLst/>
-          </a:prstGeom>
-          <a:noFill/>
-        </p:spPr>
-        <p:txBody>
-          <a:bodyPr wrap="square" rtlCol="0">
-            <a:spAutoFit/>
-          </a:bodyPr>
-          <a:lstStyle>
-            <a:defPPr>
-              <a:defRPr lang="en-US"/>
-            </a:defPPr>
-            <a:lvl1pPr algn="r">
-              <a:defRPr sz="2000">
-                <a:latin typeface="Inter Light" panose="02000503000000020004" pitchFamily="2" charset="0"/>
-                <a:ea typeface="Inter Light" panose="02000503000000020004" pitchFamily="2" charset="0"/>
-              </a:defRPr>
-            </a:lvl1pPr>
-          </a:lstStyle>
-          <a:p>
-            <a:pPr algn="ctr">
-              <a:spcAft>
-                <a:spcPts val="400"/>
-              </a:spcAft>
-            </a:pPr>
-            <a:r>
-              <a:rPr lang="en-US" altLang="zh-CN" sz="1600" dirty="0" err="1">
-                <a:latin typeface="Garamond" panose="02020404030301010803" pitchFamily="18" charset="0"/>
-              </a:rPr>
-              <a:t>Robodragons</a:t>
-            </a:r>
-            <a:r>
-              <a:rPr lang="en-US" altLang="zh-CN" sz="1600" dirty="0">
-                <a:latin typeface="Garamond" panose="02020404030301010803" pitchFamily="18" charset="0"/>
-              </a:rPr>
-              <a:t> Red Team 16796</a:t>
-            </a:r>
-          </a:p>
-          <a:p>
-            <a:pPr algn="ctr">
-              <a:spcAft>
-                <a:spcPts val="400"/>
-              </a:spcAft>
-            </a:pPr>
-            <a:r>
-              <a:rPr lang="en-US" altLang="zh-CN" sz="1600" dirty="0">
-                <a:latin typeface="Garamond" panose="02020404030301010803" pitchFamily="18" charset="0"/>
-              </a:rPr>
-              <a:t>December 22, 2022</a:t>
-            </a:r>
-          </a:p>
-        </p:txBody>
-      </p:sp>
-      <p:pic>
-        <p:nvPicPr>
-          <p:cNvPr id="5" name="Picture 4" descr="Logo, company name&#10;&#10;Description automatically generated">
-            <a:extLst>
-              <a:ext uri="{FF2B5EF4-FFF2-40B4-BE49-F238E27FC236}">
-                <a16:creationId xmlns:a16="http://schemas.microsoft.com/office/drawing/2014/main" id="{F55E7838-24FA-6B8F-99A6-867F4584B03D}"/>
-              </a:ext>
-            </a:extLst>
-          </p:cNvPr>
-          <p:cNvPicPr>
-            <a:picLocks noChangeAspect="1"/>
-          </p:cNvPicPr>
-          <p:nvPr/>
-        </p:nvPicPr>
-        <p:blipFill>
-          <a:blip r:embed="rId2">
-            <a:extLst>
-              <a:ext uri="{28A0092B-C50C-407E-A947-70E740481C1C}">
-                <a14:useLocalDpi xmlns:a14="http://schemas.microsoft.com/office/drawing/2010/main" val="0"/>
-              </a:ext>
-            </a:extLst>
-          </a:blip>
-          <a:stretch>
-            <a:fillRect/>
-          </a:stretch>
-        </p:blipFill>
-        <p:spPr>
-          <a:xfrm>
-            <a:off x="2971153" y="7049926"/>
-            <a:ext cx="908304" cy="595474"/>
-          </a:xfrm>
-          <a:prstGeom prst="rect">
-            <a:avLst/>
-          </a:prstGeom>
-        </p:spPr>
-      </p:pic>
-      <p:sp>
-        <p:nvSpPr>
-          <p:cNvPr id="9" name="TextBox 8">
-            <a:extLst>
-              <a:ext uri="{FF2B5EF4-FFF2-40B4-BE49-F238E27FC236}">
-                <a16:creationId xmlns:a16="http://schemas.microsoft.com/office/drawing/2014/main" id="{3E46B08A-2119-254D-56D6-F3CA4C4D74F3}"/>
-              </a:ext>
-            </a:extLst>
-          </p:cNvPr>
-          <p:cNvSpPr txBox="1"/>
-          <p:nvPr/>
-        </p:nvSpPr>
-        <p:spPr>
-          <a:xfrm>
-            <a:off x="368300" y="1498600"/>
-            <a:ext cx="6114010" cy="1520224"/>
-          </a:xfrm>
-          <a:prstGeom prst="rect">
-            <a:avLst/>
-          </a:prstGeom>
-          <a:noFill/>
-        </p:spPr>
-        <p:txBody>
-          <a:bodyPr wrap="square" rtlCol="0">
-            <a:spAutoFit/>
-          </a:bodyPr>
-          <a:lstStyle/>
-          <a:p>
-            <a:pPr algn="ctr">
-              <a:lnSpc>
-                <a:spcPct val="75000"/>
-              </a:lnSpc>
-            </a:pPr>
-            <a:r>
-              <a:rPr lang="en-US" altLang="zh-CN" sz="6000" b="1" dirty="0">
-                <a:solidFill>
-                  <a:schemeClr val="accent1"/>
-                </a:solidFill>
-                <a:latin typeface="Garamond" panose="02020404030301010803" pitchFamily="18" charset="0"/>
-              </a:rPr>
-              <a:t>Engineering Notebook</a:t>
-            </a:r>
-          </a:p>
-        </p:txBody>
-      </p:sp>
-      <p:pic>
-        <p:nvPicPr>
-          <p:cNvPr id="3" name="Picture 2" descr="A picture containing text, clipart&#10;&#10;Description automatically generated">
-            <a:extLst>
-              <a:ext uri="{FF2B5EF4-FFF2-40B4-BE49-F238E27FC236}">
-                <a16:creationId xmlns:a16="http://schemas.microsoft.com/office/drawing/2014/main" id="{9CDEF4CD-1E2F-DEB1-8CF0-27A2EE99BC02}"/>
-              </a:ext>
-            </a:extLst>
-          </p:cNvPr>
-          <p:cNvPicPr>
-            <a:picLocks noChangeAspect="1"/>
-          </p:cNvPicPr>
-          <p:nvPr/>
-        </p:nvPicPr>
-        <p:blipFill>
-          <a:blip r:embed="rId3">
-            <a:extLst>
-              <a:ext uri="{28A0092B-C50C-407E-A947-70E740481C1C}">
-                <a14:useLocalDpi xmlns:a14="http://schemas.microsoft.com/office/drawing/2010/main" val="0"/>
-              </a:ext>
-            </a:extLst>
-          </a:blip>
-          <a:stretch>
-            <a:fillRect/>
-          </a:stretch>
-        </p:blipFill>
-        <p:spPr>
-          <a:xfrm>
-            <a:off x="2577661" y="2927384"/>
-            <a:ext cx="1695288" cy="394022"/>
-          </a:xfrm>
-          <a:prstGeom prst="rect">
-            <a:avLst/>
-          </a:prstGeom>
-        </p:spPr>
-      </p:pic>
-    </p:spTree>
-    <p:extLst>
-      <p:ext uri="{BB962C8B-B14F-4D97-AF65-F5344CB8AC3E}">
-        <p14:creationId xmlns:p14="http://schemas.microsoft.com/office/powerpoint/2010/main" val="2564974227"/>
-      </p:ext>
-    </p:extLst>
-  </p:cSld>
-  <p:clrMapOvr>
-    <a:masterClrMapping/>
-  </p:clrMapOvr>
-</p:sld>
-</file>
-
-<file path=ppt/slides/slide3.xml><?xml version="1.0" encoding="utf-8"?>
-<p:sld xmlns:a="http://schemas.openxmlformats.org/drawingml/2006/main" xmlns:r="http://schemas.openxmlformats.org/officeDocument/2006/relationships" xmlns:p="http://schemas.openxmlformats.org/presentationml/2006/main">
-  <p:cSld>
-    <p:spTree>
-      <p:nvGrpSpPr>
-        <p:cNvPr id="1" name=""/>
-        <p:cNvGrpSpPr/>
-        <p:nvPr/>
-      </p:nvGrpSpPr>
-      <p:grpSpPr>
-        <a:xfrm>
-          <a:off x="0" y="0"/>
-          <a:ext cx="0" cy="0"/>
-          <a:chOff x="0" y="0"/>
-          <a:chExt cx="0" cy="0"/>
-        </a:xfrm>
-      </p:grpSpPr>
-      <p:sp>
-        <p:nvSpPr>
-          <p:cNvPr id="8" name="TextBox 7">
-            <a:extLst>
-              <a:ext uri="{FF2B5EF4-FFF2-40B4-BE49-F238E27FC236}">
-                <a16:creationId xmlns:a16="http://schemas.microsoft.com/office/drawing/2014/main" id="{054ECD06-C519-CB1F-335A-43BD026C50A1}"/>
-              </a:ext>
-            </a:extLst>
-          </p:cNvPr>
-          <p:cNvSpPr txBox="1"/>
-          <p:nvPr/>
-        </p:nvSpPr>
-        <p:spPr>
-          <a:xfrm>
-            <a:off x="2811780" y="7594687"/>
-            <a:ext cx="3670530" cy="636072"/>
-          </a:xfrm>
-          <a:prstGeom prst="rect">
-            <a:avLst/>
-          </a:prstGeom>
-          <a:noFill/>
-        </p:spPr>
-        <p:txBody>
-          <a:bodyPr wrap="square" rtlCol="0">
-            <a:spAutoFit/>
-          </a:bodyPr>
-          <a:lstStyle>
-            <a:defPPr>
-              <a:defRPr lang="en-US"/>
-            </a:defPPr>
-            <a:lvl1pPr algn="r">
-              <a:defRPr sz="2000">
-                <a:latin typeface="Inter Light" panose="02000503000000020004" pitchFamily="2" charset="0"/>
-                <a:ea typeface="Inter Light" panose="02000503000000020004" pitchFamily="2" charset="0"/>
-              </a:defRPr>
-            </a:lvl1pPr>
-          </a:lstStyle>
-          <a:p>
-            <a:pPr>
-              <a:spcAft>
-                <a:spcPts val="400"/>
-              </a:spcAft>
-            </a:pPr>
-            <a:r>
-              <a:rPr lang="en-US" altLang="zh-CN" sz="1600" dirty="0" err="1">
-                <a:latin typeface="Garamond" panose="02020404030301010803" pitchFamily="18" charset="0"/>
-              </a:rPr>
-              <a:t>Robodragons</a:t>
-            </a:r>
-            <a:r>
-              <a:rPr lang="en-US" altLang="zh-CN" sz="1600" dirty="0">
-                <a:latin typeface="Garamond" panose="02020404030301010803" pitchFamily="18" charset="0"/>
-              </a:rPr>
-              <a:t> Red Team 16796</a:t>
-            </a:r>
-          </a:p>
-          <a:p>
-            <a:pPr>
-              <a:spcAft>
-                <a:spcPts val="400"/>
-              </a:spcAft>
-            </a:pPr>
-            <a:r>
-              <a:rPr lang="en-US" altLang="zh-CN" sz="1600" dirty="0">
-                <a:latin typeface="Garamond" panose="02020404030301010803" pitchFamily="18" charset="0"/>
-              </a:rPr>
-              <a:t>December 22, 2022</a:t>
-            </a:r>
-          </a:p>
-        </p:txBody>
-      </p:sp>
-      <p:pic>
-        <p:nvPicPr>
-          <p:cNvPr id="5" name="Picture 4" descr="Logo, company name&#10;&#10;Description automatically generated">
-            <a:extLst>
-              <a:ext uri="{FF2B5EF4-FFF2-40B4-BE49-F238E27FC236}">
-                <a16:creationId xmlns:a16="http://schemas.microsoft.com/office/drawing/2014/main" id="{F55E7838-24FA-6B8F-99A6-867F4584B03D}"/>
-              </a:ext>
-            </a:extLst>
-          </p:cNvPr>
-          <p:cNvPicPr>
-            <a:picLocks noChangeAspect="1"/>
-          </p:cNvPicPr>
-          <p:nvPr/>
-        </p:nvPicPr>
-        <p:blipFill>
-          <a:blip r:embed="rId2">
-            <a:extLst>
-              <a:ext uri="{28A0092B-C50C-407E-A947-70E740481C1C}">
-                <a14:useLocalDpi xmlns:a14="http://schemas.microsoft.com/office/drawing/2010/main" val="0"/>
-              </a:ext>
-            </a:extLst>
-          </a:blip>
-          <a:stretch>
-            <a:fillRect/>
-          </a:stretch>
-        </p:blipFill>
-        <p:spPr>
-          <a:xfrm>
-            <a:off x="5558766" y="7049926"/>
-            <a:ext cx="908304" cy="595474"/>
-          </a:xfrm>
-          <a:prstGeom prst="rect">
-            <a:avLst/>
-          </a:prstGeom>
-        </p:spPr>
-      </p:pic>
-      <p:sp>
-        <p:nvSpPr>
-          <p:cNvPr id="9" name="TextBox 8">
-            <a:extLst>
-              <a:ext uri="{FF2B5EF4-FFF2-40B4-BE49-F238E27FC236}">
-                <a16:creationId xmlns:a16="http://schemas.microsoft.com/office/drawing/2014/main" id="{3E46B08A-2119-254D-56D6-F3CA4C4D74F3}"/>
-              </a:ext>
-            </a:extLst>
-          </p:cNvPr>
-          <p:cNvSpPr txBox="1"/>
-          <p:nvPr/>
-        </p:nvSpPr>
-        <p:spPr>
-          <a:xfrm>
-            <a:off x="368300" y="1498600"/>
-            <a:ext cx="6114010" cy="1938992"/>
-          </a:xfrm>
-          <a:prstGeom prst="rect">
-            <a:avLst/>
-          </a:prstGeom>
-          <a:noFill/>
-        </p:spPr>
-        <p:txBody>
-          <a:bodyPr wrap="square" rtlCol="0">
-            <a:spAutoFit/>
-          </a:bodyPr>
-          <a:lstStyle/>
-          <a:p>
-            <a:pPr algn="r"/>
-            <a:r>
-              <a:rPr lang="en-US" altLang="zh-CN" sz="6000" b="1" dirty="0">
-                <a:solidFill>
-                  <a:schemeClr val="accent1"/>
-                </a:solidFill>
-                <a:latin typeface="Garamond" panose="02020404030301010803" pitchFamily="18" charset="0"/>
-              </a:rPr>
-              <a:t>Engineering Notebook</a:t>
-            </a:r>
-          </a:p>
-        </p:txBody>
-      </p:sp>
-      <p:pic>
-        <p:nvPicPr>
-          <p:cNvPr id="3" name="Picture 2" descr="A picture containing text, clipart&#10;&#10;Description automatically generated">
-            <a:extLst>
-              <a:ext uri="{FF2B5EF4-FFF2-40B4-BE49-F238E27FC236}">
-                <a16:creationId xmlns:a16="http://schemas.microsoft.com/office/drawing/2014/main" id="{9CDEF4CD-1E2F-DEB1-8CF0-27A2EE99BC02}"/>
-              </a:ext>
-            </a:extLst>
-          </p:cNvPr>
-          <p:cNvPicPr>
-            <a:picLocks noChangeAspect="1"/>
-          </p:cNvPicPr>
-          <p:nvPr/>
-        </p:nvPicPr>
-        <p:blipFill>
-          <a:blip r:embed="rId3">
-            <a:extLst>
-              <a:ext uri="{28A0092B-C50C-407E-A947-70E740481C1C}">
-                <a14:useLocalDpi xmlns:a14="http://schemas.microsoft.com/office/drawing/2010/main" val="0"/>
-              </a:ext>
-            </a:extLst>
-          </a:blip>
-          <a:stretch>
-            <a:fillRect/>
-          </a:stretch>
-        </p:blipFill>
-        <p:spPr>
-          <a:xfrm>
-            <a:off x="4771552" y="3437592"/>
-            <a:ext cx="1695288" cy="394022"/>
-          </a:xfrm>
-          <a:prstGeom prst="rect">
-            <a:avLst/>
-          </a:prstGeom>
-        </p:spPr>
-      </p:pic>
-    </p:spTree>
-    <p:extLst>
-      <p:ext uri="{BB962C8B-B14F-4D97-AF65-F5344CB8AC3E}">
-        <p14:creationId xmlns:p14="http://schemas.microsoft.com/office/powerpoint/2010/main" val="3060807186"/>
       </p:ext>
     </p:extLst>
   </p:cSld>

</xml_diff>